<commit_message>
Add UWP to title
</commit_message>
<xml_diff>
--- a/Debugging1.pptx
+++ b/Debugging1.pptx
@@ -602,7 +602,7 @@
           <a:p>
             <a:fld id="{45F49CC2-C49A-4120-BFB5-52D9153EA4E0}" type="datetimeFigureOut">
               <a:rPr lang="en-GB" smtClean="0"/>
-              <a:t>05/01/2019</a:t>
+              <a:t>06/01/2019</a:t>
             </a:fld>
             <a:endParaRPr lang="en-GB"/>
           </a:p>
@@ -5813,7 +5813,7 @@
           <a:p>
             <a:fld id="{48A87A34-81AB-432B-8DAE-1953F412C126}" type="datetimeFigureOut">
               <a:rPr lang="en-US" dirty="0"/>
-              <a:t>1/5/2019</a:t>
+              <a:t>1/6/2019</a:t>
             </a:fld>
             <a:endParaRPr lang="en-US" dirty="0"/>
           </a:p>
@@ -6075,7 +6075,7 @@
           <a:p>
             <a:fld id="{48A87A34-81AB-432B-8DAE-1953F412C126}" type="datetimeFigureOut">
               <a:rPr lang="en-US" dirty="0"/>
-              <a:t>1/5/2019</a:t>
+              <a:t>1/6/2019</a:t>
             </a:fld>
             <a:endParaRPr lang="en-US" dirty="0"/>
           </a:p>
@@ -6302,7 +6302,7 @@
             <a:fld id="{48A87A34-81AB-432B-8DAE-1953F412C126}" type="datetimeFigureOut">
               <a:rPr lang="en-US" dirty="0"/>
               <a:pPr/>
-              <a:t>1/5/2019</a:t>
+              <a:t>1/6/2019</a:t>
             </a:fld>
             <a:endParaRPr lang="en-US" dirty="0"/>
           </a:p>
@@ -6608,7 +6608,7 @@
             <a:fld id="{48A87A34-81AB-432B-8DAE-1953F412C126}" type="datetimeFigureOut">
               <a:rPr lang="en-US" dirty="0"/>
               <a:pPr/>
-              <a:t>1/5/2019</a:t>
+              <a:t>1/6/2019</a:t>
             </a:fld>
             <a:endParaRPr lang="en-US" dirty="0"/>
           </a:p>
@@ -7077,7 +7077,7 @@
             <a:fld id="{48A87A34-81AB-432B-8DAE-1953F412C126}" type="datetimeFigureOut">
               <a:rPr lang="en-US" dirty="0"/>
               <a:pPr/>
-              <a:t>1/5/2019</a:t>
+              <a:t>1/6/2019</a:t>
             </a:fld>
             <a:endParaRPr lang="en-US" dirty="0"/>
           </a:p>
@@ -7619,7 +7619,7 @@
           <a:p>
             <a:fld id="{48A87A34-81AB-432B-8DAE-1953F412C126}" type="datetimeFigureOut">
               <a:rPr lang="en-US" dirty="0"/>
-              <a:t>1/5/2019</a:t>
+              <a:t>1/6/2019</a:t>
             </a:fld>
             <a:endParaRPr lang="en-US" dirty="0"/>
           </a:p>
@@ -8388,7 +8388,7 @@
           <a:p>
             <a:fld id="{48A87A34-81AB-432B-8DAE-1953F412C126}" type="datetimeFigureOut">
               <a:rPr lang="en-US" dirty="0"/>
-              <a:t>1/5/2019</a:t>
+              <a:t>1/6/2019</a:t>
             </a:fld>
             <a:endParaRPr lang="en-US" dirty="0"/>
           </a:p>
@@ -8558,7 +8558,7 @@
           <a:p>
             <a:fld id="{48A87A34-81AB-432B-8DAE-1953F412C126}" type="datetimeFigureOut">
               <a:rPr lang="en-US" dirty="0"/>
-              <a:t>1/5/2019</a:t>
+              <a:t>1/6/2019</a:t>
             </a:fld>
             <a:endParaRPr lang="en-US" dirty="0"/>
           </a:p>
@@ -8777,7 +8777,7 @@
             <a:fld id="{48A87A34-81AB-432B-8DAE-1953F412C126}" type="datetimeFigureOut">
               <a:rPr lang="en-US" dirty="0"/>
               <a:pPr/>
-              <a:t>1/5/2019</a:t>
+              <a:t>1/6/2019</a:t>
             </a:fld>
             <a:endParaRPr lang="en-US" dirty="0"/>
           </a:p>
@@ -8952,7 +8952,7 @@
           <a:p>
             <a:fld id="{48A87A34-81AB-432B-8DAE-1953F412C126}" type="datetimeFigureOut">
               <a:rPr lang="en-US" dirty="0"/>
-              <a:t>1/5/2019</a:t>
+              <a:t>1/6/2019</a:t>
             </a:fld>
             <a:endParaRPr lang="en-US" dirty="0"/>
           </a:p>
@@ -9237,7 +9237,7 @@
             <a:fld id="{48A87A34-81AB-432B-8DAE-1953F412C126}" type="datetimeFigureOut">
               <a:rPr lang="en-US" dirty="0"/>
               <a:pPr/>
-              <a:t>1/5/2019</a:t>
+              <a:t>1/6/2019</a:t>
             </a:fld>
             <a:endParaRPr lang="en-US" dirty="0"/>
           </a:p>
@@ -9474,7 +9474,7 @@
           <a:p>
             <a:fld id="{48A87A34-81AB-432B-8DAE-1953F412C126}" type="datetimeFigureOut">
               <a:rPr lang="en-US" dirty="0"/>
-              <a:t>1/5/2019</a:t>
+              <a:t>1/6/2019</a:t>
             </a:fld>
             <a:endParaRPr lang="en-US" dirty="0"/>
           </a:p>
@@ -9848,7 +9848,7 @@
           <a:p>
             <a:fld id="{48A87A34-81AB-432B-8DAE-1953F412C126}" type="datetimeFigureOut">
               <a:rPr lang="en-US" dirty="0"/>
-              <a:t>1/5/2019</a:t>
+              <a:t>1/6/2019</a:t>
             </a:fld>
             <a:endParaRPr lang="en-US" dirty="0"/>
           </a:p>
@@ -9961,7 +9961,7 @@
           <a:p>
             <a:fld id="{48A87A34-81AB-432B-8DAE-1953F412C126}" type="datetimeFigureOut">
               <a:rPr lang="en-US" dirty="0"/>
-              <a:t>1/5/2019</a:t>
+              <a:t>1/6/2019</a:t>
             </a:fld>
             <a:endParaRPr lang="en-US" dirty="0"/>
           </a:p>
@@ -10051,7 +10051,7 @@
           <a:p>
             <a:fld id="{48A87A34-81AB-432B-8DAE-1953F412C126}" type="datetimeFigureOut">
               <a:rPr lang="en-US" dirty="0"/>
-              <a:t>1/5/2019</a:t>
+              <a:t>1/6/2019</a:t>
             </a:fld>
             <a:endParaRPr lang="en-US" dirty="0"/>
           </a:p>
@@ -10295,7 +10295,7 @@
           <a:p>
             <a:fld id="{48A87A34-81AB-432B-8DAE-1953F412C126}" type="datetimeFigureOut">
               <a:rPr lang="en-US" dirty="0"/>
-              <a:t>1/5/2019</a:t>
+              <a:t>1/6/2019</a:t>
             </a:fld>
             <a:endParaRPr lang="en-US" dirty="0"/>
           </a:p>
@@ -10547,7 +10547,7 @@
           <a:p>
             <a:fld id="{48A87A34-81AB-432B-8DAE-1953F412C126}" type="datetimeFigureOut">
               <a:rPr lang="en-US" dirty="0"/>
-              <a:t>1/5/2019</a:t>
+              <a:t>1/6/2019</a:t>
             </a:fld>
             <a:endParaRPr lang="en-US" dirty="0"/>
           </a:p>
@@ -10786,7 +10786,7 @@
             <a:fld id="{48A87A34-81AB-432B-8DAE-1953F412C126}" type="datetimeFigureOut">
               <a:rPr lang="en-US" dirty="0"/>
               <a:pPr/>
-              <a:t>1/5/2019</a:t>
+              <a:t>1/6/2019</a:t>
             </a:fld>
             <a:endParaRPr lang="en-US" dirty="0"/>
           </a:p>
@@ -16172,9 +16172,10 @@
           <a:bodyPr/>
           <a:lstStyle/>
           <a:p>
-            <a:r>
-              <a:rPr lang="en-GB" dirty="0"/>
-              <a:t>WPF</a:t>
+            <a:pPr algn="ctr"/>
+            <a:r>
+              <a:rPr lang="en-GB" dirty="0"/>
+              <a:t>WPF/UWP</a:t>
             </a:r>
           </a:p>
         </p:txBody>

</xml_diff>

<commit_message>
0 Numeric overflow in Core
</commit_message>
<xml_diff>
--- a/Debugging1.pptx
+++ b/Debugging1.pptx
@@ -603,7 +603,7 @@
           <a:p>
             <a:fld id="{45F49CC2-C49A-4120-BFB5-52D9153EA4E0}" type="datetimeFigureOut">
               <a:rPr lang="en-GB" smtClean="0"/>
-              <a:t>07/01/2019</a:t>
+              <a:t>16/06/2019</a:t>
             </a:fld>
             <a:endParaRPr lang="en-GB"/>
           </a:p>
@@ -3025,8 +3025,13 @@
           <a:p>
             <a:r>
               <a:rPr lang="en-GB" dirty="0"/>
-              <a:t>What I am going to talk about</a:t>
-            </a:r>
+              <a:t>What I am going to talk about – before I start the code is often written to give examples of debugging techniques and problems – not necessarily the way I </a:t>
+            </a:r>
+            <a:r>
+              <a:rPr lang="en-GB"/>
+              <a:t>would write code</a:t>
+            </a:r>
+            <a:endParaRPr lang="en-GB" dirty="0"/>
           </a:p>
         </p:txBody>
       </p:sp>
@@ -5993,7 +5998,7 @@
           <a:p>
             <a:fld id="{48A87A34-81AB-432B-8DAE-1953F412C126}" type="datetimeFigureOut">
               <a:rPr lang="en-US" dirty="0"/>
-              <a:t>1/7/2019</a:t>
+              <a:t>6/16/2019</a:t>
             </a:fld>
             <a:endParaRPr lang="en-US" dirty="0"/>
           </a:p>
@@ -6255,7 +6260,7 @@
           <a:p>
             <a:fld id="{48A87A34-81AB-432B-8DAE-1953F412C126}" type="datetimeFigureOut">
               <a:rPr lang="en-US" dirty="0"/>
-              <a:t>1/7/2019</a:t>
+              <a:t>6/16/2019</a:t>
             </a:fld>
             <a:endParaRPr lang="en-US" dirty="0"/>
           </a:p>
@@ -6482,7 +6487,7 @@
             <a:fld id="{48A87A34-81AB-432B-8DAE-1953F412C126}" type="datetimeFigureOut">
               <a:rPr lang="en-US" dirty="0"/>
               <a:pPr/>
-              <a:t>1/7/2019</a:t>
+              <a:t>6/16/2019</a:t>
             </a:fld>
             <a:endParaRPr lang="en-US" dirty="0"/>
           </a:p>
@@ -6788,7 +6793,7 @@
             <a:fld id="{48A87A34-81AB-432B-8DAE-1953F412C126}" type="datetimeFigureOut">
               <a:rPr lang="en-US" dirty="0"/>
               <a:pPr/>
-              <a:t>1/7/2019</a:t>
+              <a:t>6/16/2019</a:t>
             </a:fld>
             <a:endParaRPr lang="en-US" dirty="0"/>
           </a:p>
@@ -7257,7 +7262,7 @@
             <a:fld id="{48A87A34-81AB-432B-8DAE-1953F412C126}" type="datetimeFigureOut">
               <a:rPr lang="en-US" dirty="0"/>
               <a:pPr/>
-              <a:t>1/7/2019</a:t>
+              <a:t>6/16/2019</a:t>
             </a:fld>
             <a:endParaRPr lang="en-US" dirty="0"/>
           </a:p>
@@ -7799,7 +7804,7 @@
           <a:p>
             <a:fld id="{48A87A34-81AB-432B-8DAE-1953F412C126}" type="datetimeFigureOut">
               <a:rPr lang="en-US" dirty="0"/>
-              <a:t>1/7/2019</a:t>
+              <a:t>6/16/2019</a:t>
             </a:fld>
             <a:endParaRPr lang="en-US" dirty="0"/>
           </a:p>
@@ -8568,7 +8573,7 @@
           <a:p>
             <a:fld id="{48A87A34-81AB-432B-8DAE-1953F412C126}" type="datetimeFigureOut">
               <a:rPr lang="en-US" dirty="0"/>
-              <a:t>1/7/2019</a:t>
+              <a:t>6/16/2019</a:t>
             </a:fld>
             <a:endParaRPr lang="en-US" dirty="0"/>
           </a:p>
@@ -8738,7 +8743,7 @@
           <a:p>
             <a:fld id="{48A87A34-81AB-432B-8DAE-1953F412C126}" type="datetimeFigureOut">
               <a:rPr lang="en-US" dirty="0"/>
-              <a:t>1/7/2019</a:t>
+              <a:t>6/16/2019</a:t>
             </a:fld>
             <a:endParaRPr lang="en-US" dirty="0"/>
           </a:p>
@@ -8957,7 +8962,7 @@
             <a:fld id="{48A87A34-81AB-432B-8DAE-1953F412C126}" type="datetimeFigureOut">
               <a:rPr lang="en-US" dirty="0"/>
               <a:pPr/>
-              <a:t>1/7/2019</a:t>
+              <a:t>6/16/2019</a:t>
             </a:fld>
             <a:endParaRPr lang="en-US" dirty="0"/>
           </a:p>
@@ -9132,7 +9137,7 @@
           <a:p>
             <a:fld id="{48A87A34-81AB-432B-8DAE-1953F412C126}" type="datetimeFigureOut">
               <a:rPr lang="en-US" dirty="0"/>
-              <a:t>1/7/2019</a:t>
+              <a:t>6/16/2019</a:t>
             </a:fld>
             <a:endParaRPr lang="en-US" dirty="0"/>
           </a:p>
@@ -9417,7 +9422,7 @@
             <a:fld id="{48A87A34-81AB-432B-8DAE-1953F412C126}" type="datetimeFigureOut">
               <a:rPr lang="en-US" dirty="0"/>
               <a:pPr/>
-              <a:t>1/7/2019</a:t>
+              <a:t>6/16/2019</a:t>
             </a:fld>
             <a:endParaRPr lang="en-US" dirty="0"/>
           </a:p>
@@ -9654,7 +9659,7 @@
           <a:p>
             <a:fld id="{48A87A34-81AB-432B-8DAE-1953F412C126}" type="datetimeFigureOut">
               <a:rPr lang="en-US" dirty="0"/>
-              <a:t>1/7/2019</a:t>
+              <a:t>6/16/2019</a:t>
             </a:fld>
             <a:endParaRPr lang="en-US" dirty="0"/>
           </a:p>
@@ -10028,7 +10033,7 @@
           <a:p>
             <a:fld id="{48A87A34-81AB-432B-8DAE-1953F412C126}" type="datetimeFigureOut">
               <a:rPr lang="en-US" dirty="0"/>
-              <a:t>1/7/2019</a:t>
+              <a:t>6/16/2019</a:t>
             </a:fld>
             <a:endParaRPr lang="en-US" dirty="0"/>
           </a:p>
@@ -10141,7 +10146,7 @@
           <a:p>
             <a:fld id="{48A87A34-81AB-432B-8DAE-1953F412C126}" type="datetimeFigureOut">
               <a:rPr lang="en-US" dirty="0"/>
-              <a:t>1/7/2019</a:t>
+              <a:t>6/16/2019</a:t>
             </a:fld>
             <a:endParaRPr lang="en-US" dirty="0"/>
           </a:p>
@@ -10231,7 +10236,7 @@
           <a:p>
             <a:fld id="{48A87A34-81AB-432B-8DAE-1953F412C126}" type="datetimeFigureOut">
               <a:rPr lang="en-US" dirty="0"/>
-              <a:t>1/7/2019</a:t>
+              <a:t>6/16/2019</a:t>
             </a:fld>
             <a:endParaRPr lang="en-US" dirty="0"/>
           </a:p>
@@ -10475,7 +10480,7 @@
           <a:p>
             <a:fld id="{48A87A34-81AB-432B-8DAE-1953F412C126}" type="datetimeFigureOut">
               <a:rPr lang="en-US" dirty="0"/>
-              <a:t>1/7/2019</a:t>
+              <a:t>6/16/2019</a:t>
             </a:fld>
             <a:endParaRPr lang="en-US" dirty="0"/>
           </a:p>
@@ -10727,7 +10732,7 @@
           <a:p>
             <a:fld id="{48A87A34-81AB-432B-8DAE-1953F412C126}" type="datetimeFigureOut">
               <a:rPr lang="en-US" dirty="0"/>
-              <a:t>1/7/2019</a:t>
+              <a:t>6/16/2019</a:t>
             </a:fld>
             <a:endParaRPr lang="en-US" dirty="0"/>
           </a:p>
@@ -10966,7 +10971,7 @@
             <a:fld id="{48A87A34-81AB-432B-8DAE-1953F412C126}" type="datetimeFigureOut">
               <a:rPr lang="en-US" dirty="0"/>
               <a:pPr/>
-              <a:t>1/7/2019</a:t>
+              <a:t>6/16/2019</a:t>
             </a:fld>
             <a:endParaRPr lang="en-US" dirty="0"/>
           </a:p>
@@ -17274,10 +17279,10 @@
       </p:sp>
       <p:pic>
         <p:nvPicPr>
-          <p:cNvPr id="5" name="Content Placeholder 4">
+          <p:cNvPr id="7" name="Content Placeholder 6" descr="A screenshot of a the Debugging Options in Visual Studio 2019&#10;">
             <a:extLst>
               <a:ext uri="{FF2B5EF4-FFF2-40B4-BE49-F238E27FC236}">
-                <a16:creationId xmlns:a16="http://schemas.microsoft.com/office/drawing/2014/main" id="{EF7780FC-0EC8-4010-9953-0E3F6C4D84FB}"/>
+                <a16:creationId xmlns:a16="http://schemas.microsoft.com/office/drawing/2014/main" id="{1E64E32F-2C20-48F1-9217-B59AB8592FCB}"/>
               </a:ext>
             </a:extLst>
           </p:cNvPr>
@@ -17296,8 +17301,8 @@
         </p:blipFill>
         <p:spPr>
           <a:xfrm>
-            <a:off x="2336006" y="2057401"/>
-            <a:ext cx="8015287" cy="4024313"/>
+            <a:off x="2842426" y="2193925"/>
+            <a:ext cx="6507148" cy="4024313"/>
           </a:xfrm>
         </p:spPr>
       </p:pic>
@@ -18441,7 +18446,7 @@
       </p:sp>
       <p:pic>
         <p:nvPicPr>
-          <p:cNvPr id="5" name="Content Placeholder 4">
+          <p:cNvPr id="5" name="Content Placeholder 4" descr="A screen of the Exception Setting in Visual Studio 2019">
             <a:extLst>
               <a:ext uri="{FF2B5EF4-FFF2-40B4-BE49-F238E27FC236}">
                 <a16:creationId xmlns:a16="http://schemas.microsoft.com/office/drawing/2014/main" id="{D6393FBB-1598-4AE9-82BD-1E4D42B8318B}"/>

</xml_diff>

<commit_message>
Add project sfor different debugging
</commit_message>
<xml_diff>
--- a/Debugging1.pptx
+++ b/Debugging1.pptx
@@ -3025,13 +3025,8 @@
           <a:p>
             <a:r>
               <a:rPr lang="en-GB" dirty="0"/>
-              <a:t>What I am going to talk about – before I start the code is often written to give examples of debugging techniques and problems – not necessarily the way I </a:t>
-            </a:r>
-            <a:r>
-              <a:rPr lang="en-GB"/>
-              <a:t>would write code</a:t>
-            </a:r>
-            <a:endParaRPr lang="en-GB" dirty="0"/>
+              <a:t>What I am going to talk about – before I start the code is often written to give examples of debugging techniques and problems – not necessarily the way I would write code</a:t>
+            </a:r>
           </a:p>
         </p:txBody>
       </p:sp>
@@ -5587,15 +5582,7 @@
           <a:p>
             <a:r>
               <a:rPr lang="en-GB" dirty="0"/>
-              <a:t>Ability to </a:t>
-            </a:r>
-            <a:r>
-              <a:rPr lang="en-GB" dirty="0" err="1"/>
-              <a:t>seach</a:t>
-            </a:r>
-            <a:r>
-              <a:rPr lang="en-GB" dirty="0"/>
-              <a:t> – divide</a:t>
+              <a:t>Ability to search – overflow</a:t>
             </a:r>
           </a:p>
           <a:p>

</xml_diff>